<commit_message>
fixup styles in chapter 10
</commit_message>
<xml_diff>
--- a/ITI/TF/Volume1/media/Figure_10.3-1.pptx
+++ b/ITI/TF/Volume1/media/Figure_10.3-1.pptx
@@ -104,6 +104,11 @@
       </a:defRPr>
     </a:lvl9pPr>
   </p:defaultTextStyle>
+  <p:extLst>
+    <p:ext uri="{EFAFB233-063F-42B5-8137-9DF3F51BA10A}">
+      <p15:sldGuideLst xmlns:p15="http://schemas.microsoft.com/office/powerpoint/2012/main"/>
+    </p:ext>
+  </p:extLst>
 </p:presentation>
 </file>
 
@@ -254,7 +259,7 @@
           <a:p>
             <a:fld id="{302F7F91-FE77-624C-934D-43071284E6FD}" type="datetimeFigureOut">
               <a:rPr lang="en-US" smtClean="0"/>
-              <a:t>8/10/20</a:t>
+              <a:t>8/26/2020</a:t>
             </a:fld>
             <a:endParaRPr lang="en-US"/>
           </a:p>
@@ -452,7 +457,7 @@
           <a:p>
             <a:fld id="{302F7F91-FE77-624C-934D-43071284E6FD}" type="datetimeFigureOut">
               <a:rPr lang="en-US" smtClean="0"/>
-              <a:t>8/10/20</a:t>
+              <a:t>8/26/2020</a:t>
             </a:fld>
             <a:endParaRPr lang="en-US"/>
           </a:p>
@@ -660,7 +665,7 @@
           <a:p>
             <a:fld id="{302F7F91-FE77-624C-934D-43071284E6FD}" type="datetimeFigureOut">
               <a:rPr lang="en-US" smtClean="0"/>
-              <a:t>8/10/20</a:t>
+              <a:t>8/26/2020</a:t>
             </a:fld>
             <a:endParaRPr lang="en-US"/>
           </a:p>
@@ -858,7 +863,7 @@
           <a:p>
             <a:fld id="{302F7F91-FE77-624C-934D-43071284E6FD}" type="datetimeFigureOut">
               <a:rPr lang="en-US" smtClean="0"/>
-              <a:t>8/10/20</a:t>
+              <a:t>8/26/2020</a:t>
             </a:fld>
             <a:endParaRPr lang="en-US"/>
           </a:p>
@@ -1133,7 +1138,7 @@
           <a:p>
             <a:fld id="{302F7F91-FE77-624C-934D-43071284E6FD}" type="datetimeFigureOut">
               <a:rPr lang="en-US" smtClean="0"/>
-              <a:t>8/10/20</a:t>
+              <a:t>8/26/2020</a:t>
             </a:fld>
             <a:endParaRPr lang="en-US"/>
           </a:p>
@@ -1398,7 +1403,7 @@
           <a:p>
             <a:fld id="{302F7F91-FE77-624C-934D-43071284E6FD}" type="datetimeFigureOut">
               <a:rPr lang="en-US" smtClean="0"/>
-              <a:t>8/10/20</a:t>
+              <a:t>8/26/2020</a:t>
             </a:fld>
             <a:endParaRPr lang="en-US"/>
           </a:p>
@@ -1810,7 +1815,7 @@
           <a:p>
             <a:fld id="{302F7F91-FE77-624C-934D-43071284E6FD}" type="datetimeFigureOut">
               <a:rPr lang="en-US" smtClean="0"/>
-              <a:t>8/10/20</a:t>
+              <a:t>8/26/2020</a:t>
             </a:fld>
             <a:endParaRPr lang="en-US"/>
           </a:p>
@@ -1951,7 +1956,7 @@
           <a:p>
             <a:fld id="{302F7F91-FE77-624C-934D-43071284E6FD}" type="datetimeFigureOut">
               <a:rPr lang="en-US" smtClean="0"/>
-              <a:t>8/10/20</a:t>
+              <a:t>8/26/2020</a:t>
             </a:fld>
             <a:endParaRPr lang="en-US"/>
           </a:p>
@@ -2064,7 +2069,7 @@
           <a:p>
             <a:fld id="{302F7F91-FE77-624C-934D-43071284E6FD}" type="datetimeFigureOut">
               <a:rPr lang="en-US" smtClean="0"/>
-              <a:t>8/10/20</a:t>
+              <a:t>8/26/2020</a:t>
             </a:fld>
             <a:endParaRPr lang="en-US"/>
           </a:p>
@@ -2375,7 +2380,7 @@
           <a:p>
             <a:fld id="{302F7F91-FE77-624C-934D-43071284E6FD}" type="datetimeFigureOut">
               <a:rPr lang="en-US" smtClean="0"/>
-              <a:t>8/10/20</a:t>
+              <a:t>8/26/2020</a:t>
             </a:fld>
             <a:endParaRPr lang="en-US"/>
           </a:p>
@@ -2663,7 +2668,7 @@
           <a:p>
             <a:fld id="{302F7F91-FE77-624C-934D-43071284E6FD}" type="datetimeFigureOut">
               <a:rPr lang="en-US" smtClean="0"/>
-              <a:t>8/10/20</a:t>
+              <a:t>8/26/2020</a:t>
             </a:fld>
             <a:endParaRPr lang="en-US"/>
           </a:p>
@@ -2904,7 +2909,7 @@
           <a:p>
             <a:fld id="{302F7F91-FE77-624C-934D-43071284E6FD}" type="datetimeFigureOut">
               <a:rPr lang="en-US" smtClean="0"/>
-              <a:t>8/10/20</a:t>
+              <a:t>8/26/2020</a:t>
             </a:fld>
             <a:endParaRPr lang="en-US"/>
           </a:p>
@@ -3402,17 +3407,23 @@
           <p:cNvGraphicFramePr>
             <a:graphicFrameLocks noChangeAspect="1"/>
           </p:cNvGraphicFramePr>
-          <p:nvPr/>
+          <p:nvPr>
+            <p:extLst>
+              <p:ext uri="{D42A27DB-BD31-4B8C-83A1-F6EECF244321}">
+                <p14:modId xmlns:p14="http://schemas.microsoft.com/office/powerpoint/2010/main" val="2931370121"/>
+              </p:ext>
+            </p:extLst>
+          </p:nvPr>
         </p:nvGraphicFramePr>
         <p:xfrm>
-          <a:off x="0" y="0"/>
-          <a:ext cx="5867400" cy="4457700"/>
+          <a:off x="702365" y="371061"/>
+          <a:ext cx="8229600" cy="6252358"/>
         </p:xfrm>
         <a:graphic>
           <a:graphicData uri="http://schemas.openxmlformats.org/presentationml/2006/ole">
             <mc:AlternateContent xmlns:mc="http://schemas.openxmlformats.org/markup-compatibility/2006">
               <mc:Choice xmlns:v="urn:schemas-microsoft-com:vml" Requires="v">
-                <p:oleObj spid="_x0000_s1027" r:id="rId3" imgW="4597400" imgH="3441700" progId="PowerPoint.Show.8">
+                <p:oleObj spid="_x0000_s1028" r:id="rId3" imgW="4597400" imgH="3441700" progId="PowerPoint.Show.8">
                   <p:embed/>
                 </p:oleObj>
               </mc:Choice>
@@ -3442,8 +3453,8 @@
                     </p:blipFill>
                     <p:spPr bwMode="auto">
                       <a:xfrm>
-                        <a:off x="0" y="0"/>
-                        <a:ext cx="5867400" cy="4457700"/>
+                        <a:off x="702365" y="371061"/>
+                        <a:ext cx="8229600" cy="6252358"/>
                       </a:xfrm>
                       <a:prstGeom prst="rect">
                         <a:avLst/>

</xml_diff>